<commit_message>
Update slides with consistent closed system node names
</commit_message>
<xml_diff>
--- a/doc/downloads/SyDEVS_Building7m_Tutorial.pptx
+++ b/doc/downloads/SyDEVS_Building7m_Tutorial.pptx
@@ -265,7 +265,7 @@
           <a:p>
             <a:fld id="{58680488-BAEA-4879-A5BD-53BB857C6DB1}" type="datetimeFigureOut">
               <a:rPr lang="en-US" smtClean="0"/>
-              <a:t>4/12/2018</a:t>
+              <a:t>4/24/2018</a:t>
             </a:fld>
             <a:endParaRPr lang="en-US"/>
           </a:p>
@@ -433,7 +433,7 @@
           <a:p>
             <a:fld id="{58680488-BAEA-4879-A5BD-53BB857C6DB1}" type="datetimeFigureOut">
               <a:rPr lang="en-US" smtClean="0"/>
-              <a:t>4/12/2018</a:t>
+              <a:t>4/24/2018</a:t>
             </a:fld>
             <a:endParaRPr lang="en-US"/>
           </a:p>
@@ -611,7 +611,7 @@
           <a:p>
             <a:fld id="{58680488-BAEA-4879-A5BD-53BB857C6DB1}" type="datetimeFigureOut">
               <a:rPr lang="en-US" smtClean="0"/>
-              <a:t>4/12/2018</a:t>
+              <a:t>4/24/2018</a:t>
             </a:fld>
             <a:endParaRPr lang="en-US"/>
           </a:p>
@@ -779,7 +779,7 @@
           <a:p>
             <a:fld id="{58680488-BAEA-4879-A5BD-53BB857C6DB1}" type="datetimeFigureOut">
               <a:rPr lang="en-US" smtClean="0"/>
-              <a:t>4/12/2018</a:t>
+              <a:t>4/24/2018</a:t>
             </a:fld>
             <a:endParaRPr lang="en-US"/>
           </a:p>
@@ -1024,7 +1024,7 @@
           <a:p>
             <a:fld id="{58680488-BAEA-4879-A5BD-53BB857C6DB1}" type="datetimeFigureOut">
               <a:rPr lang="en-US" smtClean="0"/>
-              <a:t>4/12/2018</a:t>
+              <a:t>4/24/2018</a:t>
             </a:fld>
             <a:endParaRPr lang="en-US"/>
           </a:p>
@@ -1253,7 +1253,7 @@
           <a:p>
             <a:fld id="{58680488-BAEA-4879-A5BD-53BB857C6DB1}" type="datetimeFigureOut">
               <a:rPr lang="en-US" smtClean="0"/>
-              <a:t>4/12/2018</a:t>
+              <a:t>4/24/2018</a:t>
             </a:fld>
             <a:endParaRPr lang="en-US"/>
           </a:p>
@@ -1617,7 +1617,7 @@
           <a:p>
             <a:fld id="{58680488-BAEA-4879-A5BD-53BB857C6DB1}" type="datetimeFigureOut">
               <a:rPr lang="en-US" smtClean="0"/>
-              <a:t>4/12/2018</a:t>
+              <a:t>4/24/2018</a:t>
             </a:fld>
             <a:endParaRPr lang="en-US"/>
           </a:p>
@@ -1734,7 +1734,7 @@
           <a:p>
             <a:fld id="{58680488-BAEA-4879-A5BD-53BB857C6DB1}" type="datetimeFigureOut">
               <a:rPr lang="en-US" smtClean="0"/>
-              <a:t>4/12/2018</a:t>
+              <a:t>4/24/2018</a:t>
             </a:fld>
             <a:endParaRPr lang="en-US"/>
           </a:p>
@@ -1829,7 +1829,7 @@
           <a:p>
             <a:fld id="{58680488-BAEA-4879-A5BD-53BB857C6DB1}" type="datetimeFigureOut">
               <a:rPr lang="en-US" smtClean="0"/>
-              <a:t>4/12/2018</a:t>
+              <a:t>4/24/2018</a:t>
             </a:fld>
             <a:endParaRPr lang="en-US"/>
           </a:p>
@@ -2104,7 +2104,7 @@
           <a:p>
             <a:fld id="{58680488-BAEA-4879-A5BD-53BB857C6DB1}" type="datetimeFigureOut">
               <a:rPr lang="en-US" smtClean="0"/>
-              <a:t>4/12/2018</a:t>
+              <a:t>4/24/2018</a:t>
             </a:fld>
             <a:endParaRPr lang="en-US"/>
           </a:p>
@@ -2356,7 +2356,7 @@
           <a:p>
             <a:fld id="{58680488-BAEA-4879-A5BD-53BB857C6DB1}" type="datetimeFigureOut">
               <a:rPr lang="en-US" smtClean="0"/>
-              <a:t>4/12/2018</a:t>
+              <a:t>4/24/2018</a:t>
             </a:fld>
             <a:endParaRPr lang="en-US"/>
           </a:p>
@@ -2567,7 +2567,7 @@
           <a:p>
             <a:fld id="{58680488-BAEA-4879-A5BD-53BB857C6DB1}" type="datetimeFigureOut">
               <a:rPr lang="en-US" smtClean="0"/>
-              <a:t>4/12/2018</a:t>
+              <a:t>4/24/2018</a:t>
             </a:fld>
             <a:endParaRPr lang="en-US"/>
           </a:p>
@@ -3321,7 +3321,7 @@
             </a:r>
             <a:r>
               <a:rPr lang="en-US" sz="1600" dirty="0" err="1"/>
-              <a:t>building_simulation_node.h</a:t>
+              <a:t>building_closed_system.h</a:t>
             </a:r>
             <a:r>
               <a:rPr lang="en-US" sz="1600" dirty="0"/>
@@ -3797,13 +3797,13 @@
             <a:p>
               <a:pPr algn="ctr"/>
               <a:r>
-                <a:rPr lang="en-US" sz="1100" b="1" dirty="0" err="1">
+                <a:rPr lang="en-US" sz="1100" b="1" dirty="0">
                   <a:solidFill>
                     <a:schemeClr val="tx1"/>
                   </a:solidFill>
                   <a:latin typeface="Consolas" panose="020B0609020204030204" pitchFamily="49" charset="0"/>
                 </a:rPr>
-                <a:t>building_simulation</a:t>
+                <a:t>top</a:t>
               </a:r>
               <a:endParaRPr lang="en-US" sz="900" b="1" dirty="0">
                 <a:solidFill>
@@ -3821,7 +3821,7 @@
                   </a:solidFill>
                   <a:latin typeface="Consolas" panose="020B0609020204030204" pitchFamily="49" charset="0"/>
                 </a:rPr>
-                <a:t>building_simulation_node</a:t>
+                <a:t>building_closed_system</a:t>
               </a:r>
               <a:endParaRPr lang="en-US" sz="800" dirty="0">
                 <a:solidFill>
@@ -7336,13 +7336,13 @@
             <a:p>
               <a:pPr algn="ctr"/>
               <a:r>
-                <a:rPr lang="en-US" sz="1100" b="1" dirty="0" err="1">
+                <a:rPr lang="en-US" sz="1100" b="1" dirty="0">
                   <a:solidFill>
                     <a:schemeClr val="tx1"/>
                   </a:solidFill>
                   <a:latin typeface="Consolas" panose="020B0609020204030204" pitchFamily="49" charset="0"/>
                 </a:rPr>
-                <a:t>building_simulation</a:t>
+                <a:t>top</a:t>
               </a:r>
               <a:endParaRPr lang="en-US" sz="900" b="1" dirty="0">
                 <a:solidFill>
@@ -7360,7 +7360,7 @@
                   </a:solidFill>
                   <a:latin typeface="Consolas" panose="020B0609020204030204" pitchFamily="49" charset="0"/>
                 </a:rPr>
-                <a:t>building_simulation_node</a:t>
+                <a:t>building_closed_system</a:t>
               </a:r>
               <a:endParaRPr lang="en-US" sz="800" dirty="0">
                 <a:solidFill>

</xml_diff>